<commit_message>
+ added text for the presentation
</commit_message>
<xml_diff>
--- a/presentation/present2.pptx
+++ b/presentation/present2.pptx
@@ -2,7 +2,7 @@
 <file path=ppt/presentation.xml><?xml version="1.0" encoding="utf-8"?>
 <p:presentation xmlns:a="http://schemas.openxmlformats.org/drawingml/2006/main" xmlns:r="http://schemas.openxmlformats.org/officeDocument/2006/relationships" xmlns:p="http://schemas.openxmlformats.org/presentationml/2006/main" saveSubsetFonts="1">
   <p:sldMasterIdLst>
-    <p:sldMasterId id="2147483813" r:id="rId1"/>
+    <p:sldMasterId id="2147483865" r:id="rId1"/>
   </p:sldMasterIdLst>
   <p:sldIdLst>
     <p:sldId id="256" r:id="rId2"/>
@@ -112,6 +112,11 @@
       </a:defRPr>
     </a:lvl9pPr>
   </p:defaultTextStyle>
+  <p:extLst>
+    <p:ext uri="{EFAFB233-063F-42B5-8137-9DF3F51BA10A}">
+      <p15:sldGuideLst xmlns:p15="http://schemas.microsoft.com/office/powerpoint/2012/main"/>
+    </p:ext>
+  </p:extLst>
 </p:presentation>
 </file>
 
@@ -134,7 +139,7 @@
       </p:grpSpPr>
       <p:grpSp>
         <p:nvGrpSpPr>
-          <p:cNvPr id="7" name="Group 6"/>
+          <p:cNvPr id="16" name="Group 15"/>
           <p:cNvGrpSpPr/>
           <p:nvPr/>
         </p:nvGrpSpPr>
@@ -146,9 +151,72 @@
             <a:chExt cx="12192000" cy="6866467"/>
           </a:xfrm>
         </p:grpSpPr>
+        <p:sp>
+          <p:nvSpPr>
+            <p:cNvPr id="15" name="Freeform 14"/>
+            <p:cNvSpPr/>
+            <p:nvPr/>
+          </p:nvSpPr>
+          <p:spPr>
+            <a:xfrm>
+              <a:off x="0" y="-7862"/>
+              <a:ext cx="863600" cy="5698067"/>
+            </a:xfrm>
+            <a:custGeom>
+              <a:avLst/>
+              <a:gdLst/>
+              <a:ahLst/>
+              <a:cxnLst/>
+              <a:rect l="l" t="t" r="r" b="b"/>
+              <a:pathLst>
+                <a:path w="863600" h="5698067">
+                  <a:moveTo>
+                    <a:pt x="0" y="8467"/>
+                  </a:moveTo>
+                  <a:lnTo>
+                    <a:pt x="863600" y="0"/>
+                  </a:lnTo>
+                  <a:lnTo>
+                    <a:pt x="863600" y="16934"/>
+                  </a:lnTo>
+                  <a:lnTo>
+                    <a:pt x="0" y="5698067"/>
+                  </a:lnTo>
+                  <a:lnTo>
+                    <a:pt x="0" y="8467"/>
+                  </a:lnTo>
+                  <a:close/>
+                </a:path>
+              </a:pathLst>
+            </a:custGeom>
+            <a:solidFill>
+              <a:schemeClr val="accent1">
+                <a:alpha val="70000"/>
+              </a:schemeClr>
+            </a:solidFill>
+            <a:ln>
+              <a:noFill/>
+            </a:ln>
+            <a:effectLst/>
+          </p:spPr>
+          <p:style>
+            <a:lnRef idx="1">
+              <a:schemeClr val="accent1"/>
+            </a:lnRef>
+            <a:fillRef idx="3">
+              <a:schemeClr val="accent1"/>
+            </a:fillRef>
+            <a:effectRef idx="2">
+              <a:schemeClr val="accent1"/>
+            </a:effectRef>
+            <a:fontRef idx="minor">
+              <a:schemeClr val="lt1"/>
+            </a:fontRef>
+          </p:style>
+        </p:sp>
         <p:cxnSp>
           <p:nvCxnSpPr>
-            <p:cNvPr id="32" name="Straight Connector 31"/>
+            <p:cNvPr id="19" name="Straight Connector 18"/>
             <p:cNvCxnSpPr/>
             <p:nvPr/>
           </p:nvCxnSpPr>
@@ -162,8 +230,8 @@
             </a:prstGeom>
             <a:ln w="9525">
               <a:solidFill>
-                <a:schemeClr val="bg1">
-                  <a:lumMod val="75000"/>
+                <a:schemeClr val="accent1">
+                  <a:alpha val="70000"/>
                 </a:schemeClr>
               </a:solidFill>
             </a:ln>
@@ -185,7 +253,7 @@
         </p:cxnSp>
         <p:cxnSp>
           <p:nvCxnSpPr>
-            <p:cNvPr id="21" name="Straight Connector 20"/>
+            <p:cNvPr id="20" name="Straight Connector 19"/>
             <p:cNvCxnSpPr/>
             <p:nvPr/>
           </p:nvCxnSpPr>
@@ -199,8 +267,8 @@
             </a:prstGeom>
             <a:ln w="9525">
               <a:solidFill>
-                <a:schemeClr val="bg1">
-                  <a:lumMod val="85000"/>
+                <a:schemeClr val="accent1">
+                  <a:alpha val="70000"/>
                 </a:schemeClr>
               </a:solidFill>
             </a:ln>
@@ -222,7 +290,7 @@
         </p:cxnSp>
         <p:sp>
           <p:nvSpPr>
-            <p:cNvPr id="24" name="Rectangle 23"/>
+            <p:cNvPr id="21" name="Rectangle 23"/>
             <p:cNvSpPr/>
             <p:nvPr/>
           </p:nvSpPr>
@@ -260,7 +328,7 @@
             </a:custGeom>
             <a:solidFill>
               <a:schemeClr val="accent1">
-                <a:alpha val="30000"/>
+                <a:alpha val="36000"/>
               </a:schemeClr>
             </a:solidFill>
             <a:ln>
@@ -285,7 +353,7 @@
         </p:sp>
         <p:sp>
           <p:nvSpPr>
-            <p:cNvPr id="26" name="Rectangle 25"/>
+            <p:cNvPr id="22" name="Rectangle 25"/>
             <p:cNvSpPr/>
             <p:nvPr/>
           </p:nvSpPr>
@@ -348,7 +416,7 @@
         </p:sp>
         <p:sp>
           <p:nvSpPr>
-            <p:cNvPr id="27" name="Isosceles Triangle 26"/>
+            <p:cNvPr id="23" name="Isosceles Triangle 22"/>
             <p:cNvSpPr/>
             <p:nvPr/>
           </p:nvSpPr>
@@ -363,8 +431,9 @@
               </a:avLst>
             </a:prstGeom>
             <a:solidFill>
-              <a:schemeClr val="accent2">
-                <a:alpha val="72000"/>
+              <a:schemeClr val="accent1">
+                <a:lumMod val="75000"/>
+                <a:alpha val="66000"/>
               </a:schemeClr>
             </a:solidFill>
             <a:ln>
@@ -389,7 +458,7 @@
         </p:sp>
         <p:sp>
           <p:nvSpPr>
-            <p:cNvPr id="28" name="Rectangle 27"/>
+            <p:cNvPr id="24" name="Rectangle 27"/>
             <p:cNvSpPr/>
             <p:nvPr/>
           </p:nvSpPr>
@@ -426,9 +495,9 @@
               </a:pathLst>
             </a:custGeom>
             <a:solidFill>
-              <a:schemeClr val="accent2">
+              <a:schemeClr val="accent1">
                 <a:lumMod val="75000"/>
-                <a:alpha val="70000"/>
+                <a:alpha val="50000"/>
               </a:schemeClr>
             </a:solidFill>
             <a:ln>
@@ -453,7 +522,7 @@
         </p:sp>
         <p:sp>
           <p:nvSpPr>
-            <p:cNvPr id="29" name="Rectangle 28"/>
+            <p:cNvPr id="25" name="Rectangle 28"/>
             <p:cNvSpPr/>
             <p:nvPr/>
           </p:nvSpPr>
@@ -490,9 +559,7 @@
               </a:pathLst>
             </a:custGeom>
             <a:solidFill>
-              <a:schemeClr val="accent1">
-                <a:lumMod val="60000"/>
-                <a:lumOff val="40000"/>
+              <a:schemeClr val="accent2">
                 <a:alpha val="70000"/>
               </a:schemeClr>
             </a:solidFill>
@@ -518,7 +585,7 @@
         </p:sp>
         <p:sp>
           <p:nvSpPr>
-            <p:cNvPr id="30" name="Rectangle 29"/>
+            <p:cNvPr id="26" name="Rectangle 29"/>
             <p:cNvSpPr/>
             <p:nvPr/>
           </p:nvSpPr>
@@ -555,48 +622,8 @@
               </a:pathLst>
             </a:custGeom>
             <a:solidFill>
-              <a:schemeClr val="accent1">
-                <a:alpha val="65000"/>
-              </a:schemeClr>
-            </a:solidFill>
-            <a:ln>
-              <a:noFill/>
-            </a:ln>
-            <a:effectLst/>
-          </p:spPr>
-          <p:style>
-            <a:lnRef idx="1">
-              <a:schemeClr val="accent1"/>
-            </a:lnRef>
-            <a:fillRef idx="3">
-              <a:schemeClr val="accent1"/>
-            </a:fillRef>
-            <a:effectRef idx="2">
-              <a:schemeClr val="accent1"/>
-            </a:effectRef>
-            <a:fontRef idx="minor">
-              <a:schemeClr val="lt1"/>
-            </a:fontRef>
-          </p:style>
-        </p:sp>
-        <p:sp>
-          <p:nvSpPr>
-            <p:cNvPr id="31" name="Isosceles Triangle 30"/>
-            <p:cNvSpPr/>
-            <p:nvPr/>
-          </p:nvSpPr>
-          <p:spPr>
-            <a:xfrm>
-              <a:off x="10371666" y="3589867"/>
-              <a:ext cx="1817159" cy="3268133"/>
-            </a:xfrm>
-            <a:prstGeom prst="triangle">
-              <a:avLst>
-                <a:gd name="adj" fmla="val 100000"/>
-              </a:avLst>
-            </a:prstGeom>
-            <a:solidFill>
-              <a:schemeClr val="accent1">
+              <a:schemeClr val="accent2">
+                <a:lumMod val="75000"/>
                 <a:alpha val="80000"/>
               </a:schemeClr>
             </a:solidFill>
@@ -622,14 +649,14 @@
         </p:sp>
         <p:sp>
           <p:nvSpPr>
-            <p:cNvPr id="19" name="Isosceles Triangle 18"/>
+            <p:cNvPr id="27" name="Isosceles Triangle 26"/>
             <p:cNvSpPr/>
             <p:nvPr/>
           </p:nvSpPr>
           <p:spPr>
-            <a:xfrm rot="10800000">
-              <a:off x="0" y="0"/>
-              <a:ext cx="842596" cy="5666154"/>
+            <a:xfrm>
+              <a:off x="10371666" y="3589867"/>
+              <a:ext cx="1817159" cy="3268133"/>
             </a:xfrm>
             <a:prstGeom prst="triangle">
               <a:avLst>
@@ -638,7 +665,8 @@
             </a:prstGeom>
             <a:solidFill>
               <a:schemeClr val="accent1">
-                <a:alpha val="85000"/>
+                <a:lumMod val="75000"/>
+                <a:alpha val="66000"/>
               </a:schemeClr>
             </a:solidFill>
             <a:ln>
@@ -888,7 +916,7 @@
     </p:spTree>
     <p:extLst>
       <p:ext uri="{BB962C8B-B14F-4D97-AF65-F5344CB8AC3E}">
-        <p14:creationId xmlns:p14="http://schemas.microsoft.com/office/powerpoint/2010/main" val="1888361424"/>
+        <p14:creationId xmlns:p14="http://schemas.microsoft.com/office/powerpoint/2010/main" val="3056528285"/>
       </p:ext>
     </p:extLst>
   </p:cSld>
@@ -1139,7 +1167,7 @@
     </p:spTree>
     <p:extLst>
       <p:ext uri="{BB962C8B-B14F-4D97-AF65-F5344CB8AC3E}">
-        <p14:creationId xmlns:p14="http://schemas.microsoft.com/office/powerpoint/2010/main" val="3614556835"/>
+        <p14:creationId xmlns:p14="http://schemas.microsoft.com/office/powerpoint/2010/main" val="219258726"/>
       </p:ext>
     </p:extLst>
   </p:cSld>
@@ -1452,7 +1480,7 @@
       </p:sp>
       <p:sp>
         <p:nvSpPr>
-          <p:cNvPr id="20" name="TextBox 19"/>
+          <p:cNvPr id="24" name="TextBox 23"/>
           <p:cNvSpPr txBox="1"/>
           <p:nvPr/>
         </p:nvSpPr>
@@ -1493,7 +1521,7 @@
       </p:sp>
       <p:sp>
         <p:nvSpPr>
-          <p:cNvPr id="22" name="TextBox 21"/>
+          <p:cNvPr id="25" name="TextBox 24"/>
           <p:cNvSpPr txBox="1"/>
           <p:nvPr/>
         </p:nvSpPr>
@@ -1524,26 +1552,18 @@
                     <a:lumOff val="40000"/>
                   </a:schemeClr>
                 </a:solidFill>
+                <a:effectLst/>
                 <a:latin typeface="Arial"/>
               </a:rPr>
               <a:t>”</a:t>
             </a:r>
-            <a:endParaRPr lang="en-US" dirty="0">
-              <a:solidFill>
-                <a:schemeClr val="accent1">
-                  <a:lumMod val="60000"/>
-                  <a:lumOff val="40000"/>
-                </a:schemeClr>
-              </a:solidFill>
-              <a:latin typeface="Arial"/>
-            </a:endParaRPr>
           </a:p>
         </p:txBody>
       </p:sp>
     </p:spTree>
     <p:extLst>
       <p:ext uri="{BB962C8B-B14F-4D97-AF65-F5344CB8AC3E}">
-        <p14:creationId xmlns:p14="http://schemas.microsoft.com/office/powerpoint/2010/main" val="828040441"/>
+        <p14:creationId xmlns:p14="http://schemas.microsoft.com/office/powerpoint/2010/main" val="503111214"/>
       </p:ext>
     </p:extLst>
   </p:cSld>
@@ -1794,7 +1814,7 @@
     </p:spTree>
     <p:extLst>
       <p:ext uri="{BB962C8B-B14F-4D97-AF65-F5344CB8AC3E}">
-        <p14:creationId xmlns:p14="http://schemas.microsoft.com/office/powerpoint/2010/main" val="655481344"/>
+        <p14:creationId xmlns:p14="http://schemas.microsoft.com/office/powerpoint/2010/main" val="912365706"/>
       </p:ext>
     </p:extLst>
   </p:cSld>
@@ -2190,7 +2210,7 @@
     </p:spTree>
     <p:extLst>
       <p:ext uri="{BB962C8B-B14F-4D97-AF65-F5344CB8AC3E}">
-        <p14:creationId xmlns:p14="http://schemas.microsoft.com/office/powerpoint/2010/main" val="3348265124"/>
+        <p14:creationId xmlns:p14="http://schemas.microsoft.com/office/powerpoint/2010/main" val="534374724"/>
       </p:ext>
     </p:extLst>
   </p:cSld>
@@ -2501,7 +2521,7 @@
     </p:spTree>
     <p:extLst>
       <p:ext uri="{BB962C8B-B14F-4D97-AF65-F5344CB8AC3E}">
-        <p14:creationId xmlns:p14="http://schemas.microsoft.com/office/powerpoint/2010/main" val="3246292044"/>
+        <p14:creationId xmlns:p14="http://schemas.microsoft.com/office/powerpoint/2010/main" val="1642996220"/>
       </p:ext>
     </p:extLst>
   </p:cSld>
@@ -2671,7 +2691,7 @@
     </p:spTree>
     <p:extLst>
       <p:ext uri="{BB962C8B-B14F-4D97-AF65-F5344CB8AC3E}">
-        <p14:creationId xmlns:p14="http://schemas.microsoft.com/office/powerpoint/2010/main" val="2148452733"/>
+        <p14:creationId xmlns:p14="http://schemas.microsoft.com/office/powerpoint/2010/main" val="1772018256"/>
       </p:ext>
     </p:extLst>
   </p:cSld>
@@ -2851,7 +2871,7 @@
     </p:spTree>
     <p:extLst>
       <p:ext uri="{BB962C8B-B14F-4D97-AF65-F5344CB8AC3E}">
-        <p14:creationId xmlns:p14="http://schemas.microsoft.com/office/powerpoint/2010/main" val="3956900435"/>
+        <p14:creationId xmlns:p14="http://schemas.microsoft.com/office/powerpoint/2010/main" val="4089888118"/>
       </p:ext>
     </p:extLst>
   </p:cSld>
@@ -2890,14 +2910,8 @@
         </p:nvSpPr>
         <p:spPr/>
         <p:txBody>
-          <a:bodyPr>
-            <a:normAutofit/>
-          </a:bodyPr>
-          <a:lstStyle>
-            <a:lvl1pPr>
-              <a:defRPr sz="3600"/>
-            </a:lvl1pPr>
-          </a:lstStyle>
+          <a:bodyPr/>
+          <a:lstStyle/>
           <a:p>
             <a:r>
               <a:rPr lang="en-US" smtClean="0"/>
@@ -3027,7 +3041,7 @@
     </p:spTree>
     <p:extLst>
       <p:ext uri="{BB962C8B-B14F-4D97-AF65-F5344CB8AC3E}">
-        <p14:creationId xmlns:p14="http://schemas.microsoft.com/office/powerpoint/2010/main" val="1018813377"/>
+        <p14:creationId xmlns:p14="http://schemas.microsoft.com/office/powerpoint/2010/main" val="4247978408"/>
       </p:ext>
     </p:extLst>
   </p:cSld>
@@ -3274,7 +3288,7 @@
     </p:spTree>
     <p:extLst>
       <p:ext uri="{BB962C8B-B14F-4D97-AF65-F5344CB8AC3E}">
-        <p14:creationId xmlns:p14="http://schemas.microsoft.com/office/powerpoint/2010/main" val="2665373933"/>
+        <p14:creationId xmlns:p14="http://schemas.microsoft.com/office/powerpoint/2010/main" val="3657158275"/>
       </p:ext>
     </p:extLst>
   </p:cSld>
@@ -3506,7 +3520,7 @@
     </p:spTree>
     <p:extLst>
       <p:ext uri="{BB962C8B-B14F-4D97-AF65-F5344CB8AC3E}">
-        <p14:creationId xmlns:p14="http://schemas.microsoft.com/office/powerpoint/2010/main" val="2297524580"/>
+        <p14:creationId xmlns:p14="http://schemas.microsoft.com/office/powerpoint/2010/main" val="1981641934"/>
       </p:ext>
     </p:extLst>
   </p:cSld>
@@ -3880,7 +3894,7 @@
     </p:spTree>
     <p:extLst>
       <p:ext uri="{BB962C8B-B14F-4D97-AF65-F5344CB8AC3E}">
-        <p14:creationId xmlns:p14="http://schemas.microsoft.com/office/powerpoint/2010/main" val="3686309988"/>
+        <p14:creationId xmlns:p14="http://schemas.microsoft.com/office/powerpoint/2010/main" val="4050714426"/>
       </p:ext>
     </p:extLst>
   </p:cSld>
@@ -4003,7 +4017,7 @@
     </p:spTree>
     <p:extLst>
       <p:ext uri="{BB962C8B-B14F-4D97-AF65-F5344CB8AC3E}">
-        <p14:creationId xmlns:p14="http://schemas.microsoft.com/office/powerpoint/2010/main" val="4083524183"/>
+        <p14:creationId xmlns:p14="http://schemas.microsoft.com/office/powerpoint/2010/main" val="3263451035"/>
       </p:ext>
     </p:extLst>
   </p:cSld>
@@ -4098,7 +4112,7 @@
     </p:spTree>
     <p:extLst>
       <p:ext uri="{BB962C8B-B14F-4D97-AF65-F5344CB8AC3E}">
-        <p14:creationId xmlns:p14="http://schemas.microsoft.com/office/powerpoint/2010/main" val="1026514201"/>
+        <p14:creationId xmlns:p14="http://schemas.microsoft.com/office/powerpoint/2010/main" val="1207670653"/>
       </p:ext>
     </p:extLst>
   </p:cSld>
@@ -4353,7 +4367,7 @@
     </p:spTree>
     <p:extLst>
       <p:ext uri="{BB962C8B-B14F-4D97-AF65-F5344CB8AC3E}">
-        <p14:creationId xmlns:p14="http://schemas.microsoft.com/office/powerpoint/2010/main" val="188953039"/>
+        <p14:creationId xmlns:p14="http://schemas.microsoft.com/office/powerpoint/2010/main" val="2295657004"/>
       </p:ext>
     </p:extLst>
   </p:cSld>
@@ -4550,6 +4564,48 @@
       </p:sp>
       <p:sp>
         <p:nvSpPr>
+          <p:cNvPr id="6" name="Footer Placeholder 5"/>
+          <p:cNvSpPr>
+            <a:spLocks noGrp="1"/>
+          </p:cNvSpPr>
+          <p:nvPr>
+            <p:ph type="ftr" sz="quarter" idx="11"/>
+          </p:nvPr>
+        </p:nvSpPr>
+        <p:spPr/>
+        <p:txBody>
+          <a:bodyPr/>
+          <a:lstStyle/>
+          <a:p>
+            <a:endParaRPr lang="bg-BG"/>
+          </a:p>
+        </p:txBody>
+      </p:sp>
+      <p:sp>
+        <p:nvSpPr>
+          <p:cNvPr id="7" name="Slide Number Placeholder 6"/>
+          <p:cNvSpPr>
+            <a:spLocks noGrp="1"/>
+          </p:cNvSpPr>
+          <p:nvPr>
+            <p:ph type="sldNum" sz="quarter" idx="12"/>
+          </p:nvPr>
+        </p:nvSpPr>
+        <p:spPr/>
+        <p:txBody>
+          <a:bodyPr/>
+          <a:lstStyle/>
+          <a:p>
+            <a:fld id="{E45FFC9F-E02F-4BD3-9760-E52377F571F8}" type="slidenum">
+              <a:rPr lang="bg-BG" smtClean="0"/>
+              <a:t>‹#›</a:t>
+            </a:fld>
+            <a:endParaRPr lang="bg-BG"/>
+          </a:p>
+        </p:txBody>
+      </p:sp>
+      <p:sp>
+        <p:nvSpPr>
           <p:cNvPr id="5" name="Date Placeholder 4"/>
           <p:cNvSpPr>
             <a:spLocks noGrp="1"/>
@@ -4571,52 +4627,10 @@
           </a:p>
         </p:txBody>
       </p:sp>
-      <p:sp>
-        <p:nvSpPr>
-          <p:cNvPr id="6" name="Footer Placeholder 5"/>
-          <p:cNvSpPr>
-            <a:spLocks noGrp="1"/>
-          </p:cNvSpPr>
-          <p:nvPr>
-            <p:ph type="ftr" sz="quarter" idx="11"/>
-          </p:nvPr>
-        </p:nvSpPr>
-        <p:spPr/>
-        <p:txBody>
-          <a:bodyPr/>
-          <a:lstStyle/>
-          <a:p>
-            <a:endParaRPr lang="bg-BG"/>
-          </a:p>
-        </p:txBody>
-      </p:sp>
-      <p:sp>
-        <p:nvSpPr>
-          <p:cNvPr id="7" name="Slide Number Placeholder 6"/>
-          <p:cNvSpPr>
-            <a:spLocks noGrp="1"/>
-          </p:cNvSpPr>
-          <p:nvPr>
-            <p:ph type="sldNum" sz="quarter" idx="12"/>
-          </p:nvPr>
-        </p:nvSpPr>
-        <p:spPr/>
-        <p:txBody>
-          <a:bodyPr/>
-          <a:lstStyle/>
-          <a:p>
-            <a:fld id="{E45FFC9F-E02F-4BD3-9760-E52377F571F8}" type="slidenum">
-              <a:rPr lang="bg-BG" smtClean="0"/>
-              <a:t>‹#›</a:t>
-            </a:fld>
-            <a:endParaRPr lang="bg-BG"/>
-          </a:p>
-        </p:txBody>
-      </p:sp>
     </p:spTree>
     <p:extLst>
       <p:ext uri="{BB962C8B-B14F-4D97-AF65-F5344CB8AC3E}">
-        <p14:creationId xmlns:p14="http://schemas.microsoft.com/office/powerpoint/2010/main" val="579096465"/>
+        <p14:creationId xmlns:p14="http://schemas.microsoft.com/office/powerpoint/2010/main" val="1394039253"/>
       </p:ext>
     </p:extLst>
   </p:cSld>
@@ -4650,7 +4664,7 @@
       </p:grpSpPr>
       <p:grpSp>
         <p:nvGrpSpPr>
-          <p:cNvPr id="7" name="Group 6"/>
+          <p:cNvPr id="44" name="Group 43"/>
           <p:cNvGrpSpPr/>
           <p:nvPr/>
         </p:nvGrpSpPr>
@@ -4678,8 +4692,8 @@
             </a:prstGeom>
             <a:ln w="9525">
               <a:solidFill>
-                <a:schemeClr val="bg1">
-                  <a:lumMod val="75000"/>
+                <a:schemeClr val="accent1">
+                  <a:alpha val="70000"/>
                 </a:schemeClr>
               </a:solidFill>
             </a:ln>
@@ -4715,8 +4729,8 @@
             </a:prstGeom>
             <a:ln w="9525">
               <a:solidFill>
-                <a:schemeClr val="bg1">
-                  <a:lumMod val="85000"/>
+                <a:schemeClr val="accent1">
+                  <a:alpha val="70000"/>
                 </a:schemeClr>
               </a:solidFill>
             </a:ln>
@@ -4776,7 +4790,7 @@
             </a:custGeom>
             <a:solidFill>
               <a:schemeClr val="accent1">
-                <a:alpha val="30000"/>
+                <a:alpha val="36000"/>
               </a:schemeClr>
             </a:solidFill>
             <a:ln>
@@ -4879,8 +4893,9 @@
               </a:avLst>
             </a:prstGeom>
             <a:solidFill>
-              <a:schemeClr val="accent2">
-                <a:alpha val="72000"/>
+              <a:schemeClr val="accent1">
+                <a:lumMod val="75000"/>
+                <a:alpha val="66000"/>
               </a:schemeClr>
             </a:solidFill>
             <a:ln>
@@ -4942,9 +4957,9 @@
               </a:pathLst>
             </a:custGeom>
             <a:solidFill>
-              <a:schemeClr val="accent2">
+              <a:schemeClr val="accent1">
                 <a:lumMod val="75000"/>
-                <a:alpha val="70000"/>
+                <a:alpha val="50000"/>
               </a:schemeClr>
             </a:solidFill>
             <a:ln>
@@ -5006,9 +5021,7 @@
               </a:pathLst>
             </a:custGeom>
             <a:solidFill>
-              <a:schemeClr val="accent1">
-                <a:lumMod val="60000"/>
-                <a:lumOff val="40000"/>
+              <a:schemeClr val="accent2">
                 <a:alpha val="70000"/>
               </a:schemeClr>
             </a:solidFill>
@@ -5071,8 +5084,9 @@
               </a:pathLst>
             </a:custGeom>
             <a:solidFill>
-              <a:schemeClr val="accent1">
-                <a:alpha val="65000"/>
+              <a:schemeClr val="accent2">
+                <a:lumMod val="75000"/>
+                <a:alpha val="80000"/>
               </a:schemeClr>
             </a:solidFill>
             <a:ln>
@@ -5113,7 +5127,8 @@
             </a:prstGeom>
             <a:solidFill>
               <a:schemeClr val="accent1">
-                <a:alpha val="80000"/>
+                <a:lumMod val="75000"/>
+                <a:alpha val="66000"/>
               </a:schemeClr>
             </a:solidFill>
             <a:ln>
@@ -5138,7 +5153,7 @@
         </p:sp>
         <p:sp>
           <p:nvSpPr>
-            <p:cNvPr id="29" name="Isosceles Triangle 28"/>
+            <p:cNvPr id="19" name="Isosceles Triangle 18"/>
             <p:cNvSpPr/>
             <p:nvPr/>
           </p:nvSpPr>
@@ -5154,7 +5169,7 @@
             </a:prstGeom>
             <a:solidFill>
               <a:schemeClr val="accent1">
-                <a:alpha val="85000"/>
+                <a:alpha val="70000"/>
               </a:schemeClr>
             </a:solidFill>
             <a:ln>
@@ -5393,28 +5408,28 @@
     </p:spTree>
     <p:extLst>
       <p:ext uri="{BB962C8B-B14F-4D97-AF65-F5344CB8AC3E}">
-        <p14:creationId xmlns:p14="http://schemas.microsoft.com/office/powerpoint/2010/main" val="2232395803"/>
+        <p14:creationId xmlns:p14="http://schemas.microsoft.com/office/powerpoint/2010/main" val="28970841"/>
       </p:ext>
     </p:extLst>
   </p:cSld>
   <p:clrMap bg1="lt1" tx1="dk1" bg2="lt2" tx2="dk2" accent1="accent1" accent2="accent2" accent3="accent3" accent4="accent4" accent5="accent5" accent6="accent6" hlink="hlink" folHlink="folHlink"/>
   <p:sldLayoutIdLst>
-    <p:sldLayoutId id="2147483814" r:id="rId1"/>
-    <p:sldLayoutId id="2147483815" r:id="rId2"/>
-    <p:sldLayoutId id="2147483816" r:id="rId3"/>
-    <p:sldLayoutId id="2147483817" r:id="rId4"/>
-    <p:sldLayoutId id="2147483818" r:id="rId5"/>
-    <p:sldLayoutId id="2147483819" r:id="rId6"/>
-    <p:sldLayoutId id="2147483820" r:id="rId7"/>
-    <p:sldLayoutId id="2147483821" r:id="rId8"/>
-    <p:sldLayoutId id="2147483822" r:id="rId9"/>
-    <p:sldLayoutId id="2147483823" r:id="rId10"/>
-    <p:sldLayoutId id="2147483824" r:id="rId11"/>
-    <p:sldLayoutId id="2147483825" r:id="rId12"/>
-    <p:sldLayoutId id="2147483826" r:id="rId13"/>
-    <p:sldLayoutId id="2147483827" r:id="rId14"/>
-    <p:sldLayoutId id="2147483828" r:id="rId15"/>
-    <p:sldLayoutId id="2147483829" r:id="rId16"/>
+    <p:sldLayoutId id="2147483866" r:id="rId1"/>
+    <p:sldLayoutId id="2147483867" r:id="rId2"/>
+    <p:sldLayoutId id="2147483868" r:id="rId3"/>
+    <p:sldLayoutId id="2147483869" r:id="rId4"/>
+    <p:sldLayoutId id="2147483870" r:id="rId5"/>
+    <p:sldLayoutId id="2147483871" r:id="rId6"/>
+    <p:sldLayoutId id="2147483872" r:id="rId7"/>
+    <p:sldLayoutId id="2147483873" r:id="rId8"/>
+    <p:sldLayoutId id="2147483874" r:id="rId9"/>
+    <p:sldLayoutId id="2147483875" r:id="rId10"/>
+    <p:sldLayoutId id="2147483876" r:id="rId11"/>
+    <p:sldLayoutId id="2147483877" r:id="rId12"/>
+    <p:sldLayoutId id="2147483878" r:id="rId13"/>
+    <p:sldLayoutId id="2147483879" r:id="rId14"/>
+    <p:sldLayoutId id="2147483880" r:id="rId15"/>
+    <p:sldLayoutId id="2147483881" r:id="rId16"/>
   </p:sldLayoutIdLst>
   <p:txStyles>
     <p:titleStyle>
@@ -6228,10 +6243,52 @@
         </p:nvSpPr>
         <p:spPr/>
         <p:txBody>
-          <a:bodyPr/>
-          <a:lstStyle/>
-          <a:p>
-            <a:endParaRPr lang="bg-BG"/>
+          <a:bodyPr anchor="t"/>
+          <a:lstStyle/>
+          <a:p>
+            <a:r>
+              <a:rPr lang="bg-BG" dirty="0" smtClean="0"/>
+              <a:t>При </a:t>
+            </a:r>
+            <a:r>
+              <a:rPr lang="en-US" dirty="0" smtClean="0"/>
+              <a:t>mouse move </a:t>
+            </a:r>
+            <a:r>
+              <a:rPr lang="bg-BG" dirty="0" smtClean="0"/>
+              <a:t>и </a:t>
+            </a:r>
+            <a:r>
+              <a:rPr lang="en-US" dirty="0" smtClean="0"/>
+              <a:t>mouse </a:t>
+            </a:r>
+            <a:r>
+              <a:rPr lang="en-US" dirty="0" smtClean="0"/>
+              <a:t>down </a:t>
+            </a:r>
+            <a:r>
+              <a:rPr lang="bg-BG" dirty="0" smtClean="0"/>
+              <a:t>на потребител се запазват точките, през които е минал</a:t>
+            </a:r>
+          </a:p>
+          <a:p>
+            <a:r>
+              <a:rPr lang="bg-BG" dirty="0" smtClean="0"/>
+              <a:t>При </a:t>
+            </a:r>
+            <a:r>
+              <a:rPr lang="en-US" dirty="0" smtClean="0"/>
+              <a:t>mouse up </a:t>
+            </a:r>
+            <a:r>
+              <a:rPr lang="bg-BG" dirty="0"/>
+              <a:t>ц</a:t>
+            </a:r>
+            <a:r>
+              <a:rPr lang="bg-BG" dirty="0" smtClean="0"/>
+              <a:t>вета на тези точки става бял, което симулира изтриване</a:t>
+            </a:r>
+            <a:endParaRPr lang="bg-BG" dirty="0"/>
           </a:p>
         </p:txBody>
       </p:sp>
@@ -6288,25 +6345,378 @@
           </a:p>
         </p:txBody>
       </p:sp>
-      <p:sp>
-        <p:nvSpPr>
-          <p:cNvPr id="3" name="Content Placeholder 2"/>
-          <p:cNvSpPr>
-            <a:spLocks noGrp="1"/>
-          </p:cNvSpPr>
-          <p:nvPr>
-            <p:ph idx="1"/>
-          </p:nvPr>
-        </p:nvSpPr>
-        <p:spPr/>
-        <p:txBody>
-          <a:bodyPr/>
-          <a:lstStyle/>
-          <a:p>
-            <a:endParaRPr lang="bg-BG"/>
-          </a:p>
-        </p:txBody>
-      </p:sp>
+      <mc:AlternateContent xmlns:mc="http://schemas.openxmlformats.org/markup-compatibility/2006">
+        <mc:Choice xmlns:a14="http://schemas.microsoft.com/office/drawing/2010/main" Requires="a14">
+          <p:sp>
+            <p:nvSpPr>
+              <p:cNvPr id="3" name="Content Placeholder 2"/>
+              <p:cNvSpPr>
+                <a:spLocks noGrp="1"/>
+              </p:cNvSpPr>
+              <p:nvPr>
+                <p:ph idx="1"/>
+              </p:nvPr>
+            </p:nvSpPr>
+            <p:spPr/>
+            <p:txBody>
+              <a:bodyPr anchor="t"/>
+              <a:lstStyle/>
+              <a:p>
+                <a:r>
+                  <a:rPr lang="bg-BG" dirty="0" smtClean="0"/>
+                  <a:t>За изчертване на елипса се използва уравнението на елипса </a:t>
+                </a:r>
+              </a:p>
+              <a:p>
+                <a14:m>
+                  <m:oMath xmlns:m="http://schemas.openxmlformats.org/officeDocument/2006/math">
+                    <m:f>
+                      <m:fPr>
+                        <m:ctrlPr>
+                          <a:rPr lang="bg-BG" sz="2000" i="1" smtClean="0">
+                            <a:latin typeface="Cambria Math" panose="02040503050406030204" pitchFamily="18" charset="0"/>
+                          </a:rPr>
+                        </m:ctrlPr>
+                      </m:fPr>
+                      <m:num>
+                        <m:sSup>
+                          <m:sSupPr>
+                            <m:ctrlPr>
+                              <a:rPr lang="bg-BG" sz="2000" i="1" smtClean="0">
+                                <a:latin typeface="Cambria Math" panose="02040503050406030204" pitchFamily="18" charset="0"/>
+                              </a:rPr>
+                            </m:ctrlPr>
+                          </m:sSupPr>
+                          <m:e>
+                            <m:r>
+                              <a:rPr lang="en-US" sz="2000" i="1">
+                                <a:latin typeface="Cambria Math" panose="02040503050406030204" pitchFamily="18" charset="0"/>
+                              </a:rPr>
+                              <m:t>(</m:t>
+                            </m:r>
+                            <m:r>
+                              <a:rPr lang="en-US" sz="2000" i="1">
+                                <a:latin typeface="Cambria Math" panose="02040503050406030204" pitchFamily="18" charset="0"/>
+                              </a:rPr>
+                              <m:t>𝑥</m:t>
+                            </m:r>
+                            <m:r>
+                              <a:rPr lang="en-US" sz="2000" i="1">
+                                <a:latin typeface="Cambria Math" panose="02040503050406030204" pitchFamily="18" charset="0"/>
+                              </a:rPr>
+                              <m:t>−</m:t>
+                            </m:r>
+                            <m:r>
+                              <a:rPr lang="en-US" sz="2000" i="1">
+                                <a:latin typeface="Cambria Math" panose="02040503050406030204" pitchFamily="18" charset="0"/>
+                              </a:rPr>
+                              <m:t>h</m:t>
+                            </m:r>
+                            <m:r>
+                              <a:rPr lang="en-US" sz="2000" i="1">
+                                <a:latin typeface="Cambria Math" panose="02040503050406030204" pitchFamily="18" charset="0"/>
+                              </a:rPr>
+                              <m:t>)</m:t>
+                            </m:r>
+                          </m:e>
+                          <m:sup>
+                            <m:r>
+                              <a:rPr lang="en-US" sz="2000" b="0" i="1" smtClean="0">
+                                <a:latin typeface="Cambria Math" panose="02040503050406030204" pitchFamily="18" charset="0"/>
+                              </a:rPr>
+                              <m:t>2</m:t>
+                            </m:r>
+                          </m:sup>
+                        </m:sSup>
+                      </m:num>
+                      <m:den>
+                        <m:sSup>
+                          <m:sSupPr>
+                            <m:ctrlPr>
+                              <a:rPr lang="bg-BG" sz="2000" i="1" smtClean="0">
+                                <a:latin typeface="Cambria Math" panose="02040503050406030204" pitchFamily="18" charset="0"/>
+                              </a:rPr>
+                            </m:ctrlPr>
+                          </m:sSupPr>
+                          <m:e>
+                            <m:r>
+                              <a:rPr lang="en-US" sz="2000" b="0" i="1" smtClean="0">
+                                <a:latin typeface="Cambria Math" panose="02040503050406030204" pitchFamily="18" charset="0"/>
+                              </a:rPr>
+                              <m:t>𝑎</m:t>
+                            </m:r>
+                          </m:e>
+                          <m:sup>
+                            <m:r>
+                              <a:rPr lang="en-US" sz="2000" b="0" i="1" smtClean="0">
+                                <a:latin typeface="Cambria Math" panose="02040503050406030204" pitchFamily="18" charset="0"/>
+                              </a:rPr>
+                              <m:t>2</m:t>
+                            </m:r>
+                          </m:sup>
+                        </m:sSup>
+                      </m:den>
+                    </m:f>
+                    <m:r>
+                      <a:rPr lang="en-US" sz="2000" b="0" i="1" smtClean="0">
+                        <a:latin typeface="Cambria Math" panose="02040503050406030204" pitchFamily="18" charset="0"/>
+                      </a:rPr>
+                      <m:t>+</m:t>
+                    </m:r>
+                    <m:f>
+                      <m:fPr>
+                        <m:ctrlPr>
+                          <a:rPr lang="en-US" sz="2000" b="0" i="1" smtClean="0">
+                            <a:latin typeface="Cambria Math" panose="02040503050406030204" pitchFamily="18" charset="0"/>
+                          </a:rPr>
+                        </m:ctrlPr>
+                      </m:fPr>
+                      <m:num>
+                        <m:sSup>
+                          <m:sSupPr>
+                            <m:ctrlPr>
+                              <a:rPr lang="en-US" sz="2000" b="0" i="1" smtClean="0">
+                                <a:latin typeface="Cambria Math" panose="02040503050406030204" pitchFamily="18" charset="0"/>
+                              </a:rPr>
+                            </m:ctrlPr>
+                          </m:sSupPr>
+                          <m:e>
+                            <m:r>
+                              <a:rPr lang="en-US" sz="2000" b="0" i="1" smtClean="0">
+                                <a:latin typeface="Cambria Math" panose="02040503050406030204" pitchFamily="18" charset="0"/>
+                              </a:rPr>
+                              <m:t>(</m:t>
+                            </m:r>
+                            <m:r>
+                              <a:rPr lang="en-US" sz="2000" b="0" i="1" smtClean="0">
+                                <a:latin typeface="Cambria Math" panose="02040503050406030204" pitchFamily="18" charset="0"/>
+                              </a:rPr>
+                              <m:t>𝑦</m:t>
+                            </m:r>
+                            <m:r>
+                              <a:rPr lang="en-US" sz="2000" b="0" i="1" smtClean="0">
+                                <a:latin typeface="Cambria Math" panose="02040503050406030204" pitchFamily="18" charset="0"/>
+                              </a:rPr>
+                              <m:t>−</m:t>
+                            </m:r>
+                            <m:r>
+                              <a:rPr lang="en-US" sz="2000" b="0" i="1" smtClean="0">
+                                <a:latin typeface="Cambria Math" panose="02040503050406030204" pitchFamily="18" charset="0"/>
+                              </a:rPr>
+                              <m:t>𝑘</m:t>
+                            </m:r>
+                            <m:r>
+                              <a:rPr lang="en-US" sz="2000" b="0" i="1" smtClean="0">
+                                <a:latin typeface="Cambria Math" panose="02040503050406030204" pitchFamily="18" charset="0"/>
+                              </a:rPr>
+                              <m:t>)</m:t>
+                            </m:r>
+                          </m:e>
+                          <m:sup>
+                            <m:r>
+                              <a:rPr lang="en-US" sz="2000" b="0" i="1" smtClean="0">
+                                <a:latin typeface="Cambria Math" panose="02040503050406030204" pitchFamily="18" charset="0"/>
+                              </a:rPr>
+                              <m:t>2</m:t>
+                            </m:r>
+                          </m:sup>
+                        </m:sSup>
+                      </m:num>
+                      <m:den>
+                        <m:sSup>
+                          <m:sSupPr>
+                            <m:ctrlPr>
+                              <a:rPr lang="en-US" sz="2000" b="0" i="1" smtClean="0">
+                                <a:latin typeface="Cambria Math" panose="02040503050406030204" pitchFamily="18" charset="0"/>
+                              </a:rPr>
+                            </m:ctrlPr>
+                          </m:sSupPr>
+                          <m:e>
+                            <m:r>
+                              <a:rPr lang="en-US" sz="2000" b="0" i="1" smtClean="0">
+                                <a:latin typeface="Cambria Math" panose="02040503050406030204" pitchFamily="18" charset="0"/>
+                              </a:rPr>
+                              <m:t>𝑏</m:t>
+                            </m:r>
+                          </m:e>
+                          <m:sup>
+                            <m:r>
+                              <a:rPr lang="en-US" sz="2000" b="0" i="1" smtClean="0">
+                                <a:latin typeface="Cambria Math" panose="02040503050406030204" pitchFamily="18" charset="0"/>
+                              </a:rPr>
+                              <m:t>2</m:t>
+                            </m:r>
+                          </m:sup>
+                        </m:sSup>
+                      </m:den>
+                    </m:f>
+                    <m:r>
+                      <a:rPr lang="en-US" sz="2000" b="0" i="1" smtClean="0">
+                        <a:latin typeface="Cambria Math" panose="02040503050406030204" pitchFamily="18" charset="0"/>
+                      </a:rPr>
+                      <m:t>=1</m:t>
+                    </m:r>
+                  </m:oMath>
+                </a14:m>
+                <a:endParaRPr lang="en-US" sz="2000" dirty="0" smtClean="0"/>
+              </a:p>
+              <a:p>
+                <a14:m>
+                  <m:oMath xmlns:m="http://schemas.openxmlformats.org/officeDocument/2006/math">
+                    <m:r>
+                      <a:rPr lang="bg-BG" b="0" i="1" smtClean="0">
+                        <a:latin typeface="Cambria Math" panose="02040503050406030204" pitchFamily="18" charset="0"/>
+                      </a:rPr>
+                      <m:t>(</m:t>
+                    </m:r>
+                    <m:r>
+                      <a:rPr lang="en-US" b="0" i="1" smtClean="0">
+                        <a:latin typeface="Cambria Math" panose="02040503050406030204" pitchFamily="18" charset="0"/>
+                      </a:rPr>
+                      <m:t>h</m:t>
+                    </m:r>
+                    <m:r>
+                      <a:rPr lang="en-US" b="0" i="1" smtClean="0">
+                        <a:latin typeface="Cambria Math" panose="02040503050406030204" pitchFamily="18" charset="0"/>
+                      </a:rPr>
+                      <m:t>,</m:t>
+                    </m:r>
+                    <m:r>
+                      <a:rPr lang="en-US" b="0" i="1" smtClean="0">
+                        <a:latin typeface="Cambria Math" panose="02040503050406030204" pitchFamily="18" charset="0"/>
+                      </a:rPr>
+                      <m:t>𝑘</m:t>
+                    </m:r>
+                    <m:r>
+                      <a:rPr lang="bg-BG" b="0" i="1" smtClean="0">
+                        <a:latin typeface="Cambria Math" panose="02040503050406030204" pitchFamily="18" charset="0"/>
+                      </a:rPr>
+                      <m:t>)</m:t>
+                    </m:r>
+                  </m:oMath>
+                </a14:m>
+                <a:r>
+                  <a:rPr lang="en-US" dirty="0" smtClean="0"/>
+                  <a:t> </a:t>
+                </a:r>
+                <a:r>
+                  <a:rPr lang="bg-BG" dirty="0" smtClean="0"/>
+                  <a:t>е центърът на елипсата</a:t>
+                </a:r>
+              </a:p>
+              <a:p>
+                <a14:m>
+                  <m:oMath xmlns:m="http://schemas.openxmlformats.org/officeDocument/2006/math">
+                    <m:r>
+                      <a:rPr lang="bg-BG" b="0" i="1" smtClean="0">
+                        <a:latin typeface="Cambria Math" panose="02040503050406030204" pitchFamily="18" charset="0"/>
+                      </a:rPr>
+                      <m:t>а</m:t>
+                    </m:r>
+                  </m:oMath>
+                </a14:m>
+                <a:r>
+                  <a:rPr lang="bg-BG" dirty="0" smtClean="0"/>
+                  <a:t> е главния радиус</a:t>
+                </a:r>
+              </a:p>
+              <a:p>
+                <a14:m>
+                  <m:oMath xmlns:m="http://schemas.openxmlformats.org/officeDocument/2006/math">
+                    <m:r>
+                      <a:rPr lang="en-US" b="0" i="1" smtClean="0">
+                        <a:latin typeface="Cambria Math" panose="02040503050406030204" pitchFamily="18" charset="0"/>
+                      </a:rPr>
+                      <m:t>𝑏</m:t>
+                    </m:r>
+                  </m:oMath>
+                </a14:m>
+                <a:r>
+                  <a:rPr lang="en-US" dirty="0" smtClean="0"/>
+                  <a:t> </a:t>
+                </a:r>
+                <a:r>
+                  <a:rPr lang="bg-BG" dirty="0" smtClean="0"/>
+                  <a:t>е втория радиус</a:t>
+                </a:r>
+              </a:p>
+              <a:p>
+                <a:endParaRPr lang="bg-BG" dirty="0" smtClean="0"/>
+              </a:p>
+              <a:p>
+                <a:r>
+                  <a:rPr lang="bg-BG" dirty="0" smtClean="0"/>
+                  <a:t>Първо се изчертава горната част на елипсата, след това долната</a:t>
+                </a:r>
+                <a:endParaRPr lang="bg-BG" dirty="0"/>
+              </a:p>
+            </p:txBody>
+          </p:sp>
+        </mc:Choice>
+        <mc:Fallback>
+          <p:sp>
+            <p:nvSpPr>
+              <p:cNvPr id="3" name="Content Placeholder 2"/>
+              <p:cNvSpPr>
+                <a:spLocks noGrp="1" noRot="1" noChangeAspect="1" noMove="1" noResize="1" noEditPoints="1" noAdjustHandles="1" noChangeArrowheads="1" noChangeShapeType="1" noTextEdit="1"/>
+              </p:cNvSpPr>
+              <p:nvPr>
+                <p:ph idx="1"/>
+              </p:nvPr>
+            </p:nvSpPr>
+            <p:spPr>
+              <a:blipFill rotWithShape="0">
+                <a:blip r:embed="rId2"/>
+                <a:stretch>
+                  <a:fillRect l="-142" t="-942"/>
+                </a:stretch>
+              </a:blipFill>
+            </p:spPr>
+            <p:txBody>
+              <a:bodyPr/>
+              <a:lstStyle/>
+              <a:p>
+                <a:r>
+                  <a:rPr lang="bg-BG">
+                    <a:noFill/>
+                  </a:rPr>
+                  <a:t> </a:t>
+                </a:r>
+              </a:p>
+            </p:txBody>
+          </p:sp>
+        </mc:Fallback>
+      </mc:AlternateContent>
+      <p:pic>
+        <p:nvPicPr>
+          <p:cNvPr id="5" name="Picture 4"/>
+          <p:cNvPicPr>
+            <a:picLocks noChangeAspect="1"/>
+          </p:cNvPicPr>
+          <p:nvPr/>
+        </p:nvPicPr>
+        <p:blipFill>
+          <a:blip r:embed="rId3">
+            <a:extLst>
+              <a:ext uri="{28A0092B-C50C-407E-A947-70E740481C1C}">
+                <a14:useLocalDpi xmlns:a14="http://schemas.microsoft.com/office/drawing/2010/main" val="0"/>
+              </a:ext>
+            </a:extLst>
+          </a:blip>
+          <a:stretch>
+            <a:fillRect/>
+          </a:stretch>
+        </p:blipFill>
+        <p:spPr>
+          <a:xfrm>
+            <a:off x="4555547" y="2564823"/>
+            <a:ext cx="3524250" cy="2171700"/>
+          </a:xfrm>
+          <a:prstGeom prst="rect">
+            <a:avLst/>
+          </a:prstGeom>
+        </p:spPr>
+      </p:pic>
     </p:spTree>
     <p:extLst>
       <p:ext uri="{BB962C8B-B14F-4D97-AF65-F5344CB8AC3E}">
@@ -6375,7 +6785,33 @@
           <a:bodyPr/>
           <a:lstStyle/>
           <a:p>
-            <a:endParaRPr lang="bg-BG"/>
+            <a:r>
+              <a:rPr lang="bg-BG" dirty="0" smtClean="0"/>
+              <a:t>При </a:t>
+            </a:r>
+            <a:r>
+              <a:rPr lang="en-US" dirty="0" smtClean="0"/>
+              <a:t>mouse down </a:t>
+            </a:r>
+            <a:r>
+              <a:rPr lang="bg-BG" dirty="0" smtClean="0"/>
+              <a:t>и </a:t>
+            </a:r>
+            <a:r>
+              <a:rPr lang="en-US" dirty="0" smtClean="0"/>
+              <a:t>mouse up </a:t>
+            </a:r>
+            <a:r>
+              <a:rPr lang="bg-BG" dirty="0" smtClean="0"/>
+              <a:t>се запазват две точки, които дефинират правоъгълна област</a:t>
+            </a:r>
+          </a:p>
+          <a:p>
+            <a:r>
+              <a:rPr lang="bg-BG" dirty="0" smtClean="0"/>
+              <a:t>Тази правоъгълна област от точки се запазва и се използва в другите инструменти</a:t>
+            </a:r>
+            <a:endParaRPr lang="bg-BG" dirty="0"/>
           </a:p>
         </p:txBody>
       </p:sp>
@@ -6432,25 +6868,233 @@
           </a:p>
         </p:txBody>
       </p:sp>
-      <p:sp>
-        <p:nvSpPr>
-          <p:cNvPr id="3" name="Content Placeholder 2"/>
-          <p:cNvSpPr>
-            <a:spLocks noGrp="1"/>
-          </p:cNvSpPr>
-          <p:nvPr>
-            <p:ph idx="1"/>
-          </p:nvPr>
-        </p:nvSpPr>
-        <p:spPr/>
-        <p:txBody>
-          <a:bodyPr/>
-          <a:lstStyle/>
-          <a:p>
-            <a:endParaRPr lang="bg-BG"/>
-          </a:p>
-        </p:txBody>
-      </p:sp>
+      <mc:AlternateContent xmlns:mc="http://schemas.openxmlformats.org/markup-compatibility/2006">
+        <mc:Choice xmlns:a14="http://schemas.microsoft.com/office/drawing/2010/main" Requires="a14">
+          <p:sp>
+            <p:nvSpPr>
+              <p:cNvPr id="3" name="Content Placeholder 2"/>
+              <p:cNvSpPr>
+                <a:spLocks noGrp="1"/>
+              </p:cNvSpPr>
+              <p:nvPr>
+                <p:ph idx="1"/>
+              </p:nvPr>
+            </p:nvSpPr>
+            <p:spPr/>
+            <p:txBody>
+              <a:bodyPr/>
+              <a:lstStyle/>
+              <a:p>
+                <a:r>
+                  <a:rPr lang="bg-BG" dirty="0" smtClean="0"/>
+                  <a:t>Взимаме селектирана област от точки с даден център</a:t>
+                </a:r>
+              </a:p>
+              <a:p>
+                <a:r>
+                  <a:rPr lang="bg-BG" dirty="0" smtClean="0"/>
+                  <a:t>Използваме матрица за завъртане обратно на часовниковата стрелка с ъгъл </a:t>
+                </a:r>
+                <a14:m>
+                  <m:oMath xmlns:m="http://schemas.openxmlformats.org/officeDocument/2006/math">
+                    <m:r>
+                      <a:rPr lang="bg-BG" i="1" smtClean="0">
+                        <a:latin typeface="Cambria Math" panose="02040503050406030204" pitchFamily="18" charset="0"/>
+                        <a:ea typeface="Cambria Math" panose="02040503050406030204" pitchFamily="18" charset="0"/>
+                      </a:rPr>
+                      <m:t>𝜃</m:t>
+                    </m:r>
+                  </m:oMath>
+                </a14:m>
+                <a:endParaRPr lang="bg-BG" dirty="0" smtClean="0"/>
+              </a:p>
+              <a:p>
+                <a14:m>
+                  <m:oMath xmlns:m="http://schemas.openxmlformats.org/officeDocument/2006/math">
+                    <m:r>
+                      <a:rPr lang="en-US" b="0" i="1" smtClean="0">
+                        <a:latin typeface="Cambria Math" panose="02040503050406030204" pitchFamily="18" charset="0"/>
+                      </a:rPr>
+                      <m:t>𝑅</m:t>
+                    </m:r>
+                    <m:r>
+                      <a:rPr lang="en-US" b="0" i="1" smtClean="0">
+                        <a:latin typeface="Cambria Math" panose="02040503050406030204" pitchFamily="18" charset="0"/>
+                      </a:rPr>
+                      <m:t>=</m:t>
+                    </m:r>
+                    <m:d>
+                      <m:dPr>
+                        <m:ctrlPr>
+                          <a:rPr lang="en-US" b="0" i="1" smtClean="0">
+                            <a:latin typeface="Cambria Math" panose="02040503050406030204" pitchFamily="18" charset="0"/>
+                          </a:rPr>
+                        </m:ctrlPr>
+                      </m:dPr>
+                      <m:e>
+                        <m:m>
+                          <m:mPr>
+                            <m:mcs>
+                              <m:mc>
+                                <m:mcPr>
+                                  <m:count m:val="2"/>
+                                  <m:mcJc m:val="center"/>
+                                </m:mcPr>
+                              </m:mc>
+                            </m:mcs>
+                            <m:ctrlPr>
+                              <a:rPr lang="en-US" b="0" i="1" smtClean="0">
+                                <a:latin typeface="Cambria Math" panose="02040503050406030204" pitchFamily="18" charset="0"/>
+                              </a:rPr>
+                            </m:ctrlPr>
+                          </m:mPr>
+                          <m:mr>
+                            <m:e>
+                              <m:r>
+                                <m:rPr>
+                                  <m:brk m:alnAt="7"/>
+                                </m:rPr>
+                                <a:rPr lang="en-US" b="0" i="1" smtClean="0">
+                                  <a:latin typeface="Cambria Math" panose="02040503050406030204" pitchFamily="18" charset="0"/>
+                                </a:rPr>
+                                <m:t>𝑐𝑜𝑠</m:t>
+                              </m:r>
+                              <m:r>
+                                <a:rPr lang="en-US" b="0" i="1" smtClean="0">
+                                  <a:latin typeface="Cambria Math" panose="02040503050406030204" pitchFamily="18" charset="0"/>
+                                  <a:ea typeface="Cambria Math" panose="02040503050406030204" pitchFamily="18" charset="0"/>
+                                </a:rPr>
+                                <m:t>𝜃</m:t>
+                              </m:r>
+                            </m:e>
+                            <m:e>
+                              <m:r>
+                                <a:rPr lang="en-US" b="0" i="1" smtClean="0">
+                                  <a:latin typeface="Cambria Math" panose="02040503050406030204" pitchFamily="18" charset="0"/>
+                                </a:rPr>
+                                <m:t>−</m:t>
+                              </m:r>
+                              <m:r>
+                                <a:rPr lang="en-US" b="0" i="1" smtClean="0">
+                                  <a:latin typeface="Cambria Math" panose="02040503050406030204" pitchFamily="18" charset="0"/>
+                                </a:rPr>
+                                <m:t>𝑠𝑖𝑛</m:t>
+                              </m:r>
+                              <m:r>
+                                <a:rPr lang="en-US" b="0" i="1" smtClean="0">
+                                  <a:latin typeface="Cambria Math" panose="02040503050406030204" pitchFamily="18" charset="0"/>
+                                  <a:ea typeface="Cambria Math" panose="02040503050406030204" pitchFamily="18" charset="0"/>
+                                </a:rPr>
+                                <m:t>𝜃</m:t>
+                              </m:r>
+                            </m:e>
+                          </m:mr>
+                          <m:mr>
+                            <m:e>
+                              <m:r>
+                                <a:rPr lang="en-US" b="0" i="1" smtClean="0">
+                                  <a:latin typeface="Cambria Math" panose="02040503050406030204" pitchFamily="18" charset="0"/>
+                                </a:rPr>
+                                <m:t>𝑠𝑖𝑛</m:t>
+                              </m:r>
+                              <m:r>
+                                <a:rPr lang="en-US" b="0" i="1" smtClean="0">
+                                  <a:latin typeface="Cambria Math" panose="02040503050406030204" pitchFamily="18" charset="0"/>
+                                  <a:ea typeface="Cambria Math" panose="02040503050406030204" pitchFamily="18" charset="0"/>
+                                </a:rPr>
+                                <m:t>𝜃</m:t>
+                              </m:r>
+                            </m:e>
+                            <m:e>
+                              <m:r>
+                                <a:rPr lang="en-US" b="0" i="1" smtClean="0">
+                                  <a:latin typeface="Cambria Math" panose="02040503050406030204" pitchFamily="18" charset="0"/>
+                                </a:rPr>
+                                <m:t>𝑐𝑜𝑠</m:t>
+                              </m:r>
+                              <m:r>
+                                <a:rPr lang="en-US" b="0" i="1" smtClean="0">
+                                  <a:latin typeface="Cambria Math" panose="02040503050406030204" pitchFamily="18" charset="0"/>
+                                  <a:ea typeface="Cambria Math" panose="02040503050406030204" pitchFamily="18" charset="0"/>
+                                </a:rPr>
+                                <m:t>𝜃</m:t>
+                              </m:r>
+                            </m:e>
+                          </m:mr>
+                        </m:m>
+                      </m:e>
+                    </m:d>
+                  </m:oMath>
+                </a14:m>
+                <a:endParaRPr lang="bg-BG" dirty="0" smtClean="0"/>
+              </a:p>
+              <a:p>
+                <a:r>
+                  <a:rPr lang="bg-BG" dirty="0" smtClean="0"/>
+                  <a:t>Тъй като тази матрица работи само ако завъртаме около началото на координатната система, а не около произволен център, то се прилага следният алгоритъм:</a:t>
+                </a:r>
+              </a:p>
+              <a:p>
+                <a:pPr lvl="1"/>
+                <a:r>
+                  <a:rPr lang="bg-BG" dirty="0" smtClean="0"/>
+                  <a:t>Транслираме всяка избрана точка до (0,0)</a:t>
+                </a:r>
+              </a:p>
+              <a:p>
+                <a:pPr lvl="1"/>
+                <a:r>
+                  <a:rPr lang="bg-BG" dirty="0" smtClean="0"/>
+                  <a:t>Прилагаме матрицата за завъртане</a:t>
+                </a:r>
+              </a:p>
+              <a:p>
+                <a:pPr lvl="1"/>
+                <a:r>
+                  <a:rPr lang="bg-BG" dirty="0" smtClean="0"/>
+                  <a:t>Транслираме обратно точките</a:t>
+                </a:r>
+              </a:p>
+              <a:p>
+                <a:endParaRPr lang="bg-BG" dirty="0"/>
+              </a:p>
+            </p:txBody>
+          </p:sp>
+        </mc:Choice>
+        <mc:Fallback>
+          <p:sp>
+            <p:nvSpPr>
+              <p:cNvPr id="3" name="Content Placeholder 2"/>
+              <p:cNvSpPr>
+                <a:spLocks noGrp="1" noRot="1" noChangeAspect="1" noMove="1" noResize="1" noEditPoints="1" noAdjustHandles="1" noChangeArrowheads="1" noChangeShapeType="1" noTextEdit="1"/>
+              </p:cNvSpPr>
+              <p:nvPr>
+                <p:ph idx="1"/>
+              </p:nvPr>
+            </p:nvSpPr>
+            <p:spPr>
+              <a:blipFill rotWithShape="0">
+                <a:blip r:embed="rId2"/>
+                <a:stretch>
+                  <a:fillRect l="-142" t="-942"/>
+                </a:stretch>
+              </a:blipFill>
+            </p:spPr>
+            <p:txBody>
+              <a:bodyPr/>
+              <a:lstStyle/>
+              <a:p>
+                <a:r>
+                  <a:rPr lang="bg-BG">
+                    <a:noFill/>
+                  </a:rPr>
+                  <a:t> </a:t>
+                </a:r>
+              </a:p>
+            </p:txBody>
+          </p:sp>
+        </mc:Fallback>
+      </mc:AlternateContent>
     </p:spTree>
     <p:extLst>
       <p:ext uri="{BB962C8B-B14F-4D97-AF65-F5344CB8AC3E}">
@@ -6481,28 +7125,28 @@
         <a:srgbClr val="EBEBEB"/>
       </a:lt2>
       <a:accent1>
-        <a:srgbClr val="90C226"/>
+        <a:srgbClr val="5FCBEF"/>
       </a:accent1>
       <a:accent2>
-        <a:srgbClr val="54A021"/>
+        <a:srgbClr val="2E83C3"/>
       </a:accent2>
       <a:accent3>
-        <a:srgbClr val="E6B91E"/>
+        <a:srgbClr val="42D0A2"/>
       </a:accent3>
       <a:accent4>
-        <a:srgbClr val="E76618"/>
+        <a:srgbClr val="2E946B"/>
       </a:accent4>
       <a:accent5>
-        <a:srgbClr val="C42F1A"/>
+        <a:srgbClr val="42B051"/>
       </a:accent5>
       <a:accent6>
-        <a:srgbClr val="918655"/>
+        <a:srgbClr val="96D141"/>
       </a:accent6>
       <a:hlink>
-        <a:srgbClr val="99CA3C"/>
+        <a:srgbClr val="3FCDE7"/>
       </a:hlink>
       <a:folHlink>
-        <a:srgbClr val="B9D181"/>
+        <a:srgbClr val="A9D3E1"/>
       </a:folHlink>
     </a:clrScheme>
     <a:fontScheme name="Facet">
@@ -6715,7 +7359,7 @@
   <a:extraClrSchemeLst/>
   <a:extLst>
     <a:ext uri="{05A4C25C-085E-4340-85A3-A5531E510DB2}">
-      <thm15:themeFamily xmlns:thm15="http://schemas.microsoft.com/office/thememl/2012/main" name="Facet" id="{C0C680CD-088A-49FC-A102-D699147F32B2}" vid="{CFBC31BA-B70F-4F30-BCAA-4F3011E16C4D}"/>
+      <thm15:themeFamily xmlns:thm15="http://schemas.microsoft.com/office/thememl/2012/main" name="Facet" id="{C0C680CD-088A-49FC-A102-D699147F32B2}" vid="{0B5AB586-D108-4FC1-8368-649FE654B894}"/>
     </a:ext>
   </a:extLst>
 </a:theme>

</xml_diff>